<commit_message>
First draft of clause 6
</commit_message>
<xml_diff>
--- a/UDG study diagrams.pptx
+++ b/UDG study diagrams.pptx
@@ -108,6 +108,11 @@
       </a:defRPr>
     </a:lvl9pPr>
   </p:defaultTextStyle>
+  <p:extLst>
+    <p:ext uri="{EFAFB233-063F-42B5-8137-9DF3F51BA10A}">
+      <p15:sldGuideLst xmlns:p15="http://schemas.microsoft.com/office/powerpoint/2012/main"/>
+    </p:ext>
+  </p:extLst>
 </p:presentation>
 </file>
 
@@ -258,7 +263,7 @@
           <a:p>
             <a:fld id="{5B3B0695-030B-9245-9AD3-84362AD4BE89}" type="datetimeFigureOut">
               <a:rPr lang="en-US" smtClean="0"/>
-              <a:t>9/16/25</a:t>
+              <a:t>10/13/25</a:t>
             </a:fld>
             <a:endParaRPr lang="en-US"/>
           </a:p>
@@ -456,7 +461,7 @@
           <a:p>
             <a:fld id="{5B3B0695-030B-9245-9AD3-84362AD4BE89}" type="datetimeFigureOut">
               <a:rPr lang="en-US" smtClean="0"/>
-              <a:t>9/16/25</a:t>
+              <a:t>10/13/25</a:t>
             </a:fld>
             <a:endParaRPr lang="en-US"/>
           </a:p>
@@ -664,7 +669,7 @@
           <a:p>
             <a:fld id="{5B3B0695-030B-9245-9AD3-84362AD4BE89}" type="datetimeFigureOut">
               <a:rPr lang="en-US" smtClean="0"/>
-              <a:t>9/16/25</a:t>
+              <a:t>10/13/25</a:t>
             </a:fld>
             <a:endParaRPr lang="en-US"/>
           </a:p>
@@ -862,7 +867,7 @@
           <a:p>
             <a:fld id="{5B3B0695-030B-9245-9AD3-84362AD4BE89}" type="datetimeFigureOut">
               <a:rPr lang="en-US" smtClean="0"/>
-              <a:t>9/16/25</a:t>
+              <a:t>10/13/25</a:t>
             </a:fld>
             <a:endParaRPr lang="en-US"/>
           </a:p>
@@ -1137,7 +1142,7 @@
           <a:p>
             <a:fld id="{5B3B0695-030B-9245-9AD3-84362AD4BE89}" type="datetimeFigureOut">
               <a:rPr lang="en-US" smtClean="0"/>
-              <a:t>9/16/25</a:t>
+              <a:t>10/13/25</a:t>
             </a:fld>
             <a:endParaRPr lang="en-US"/>
           </a:p>
@@ -1402,7 +1407,7 @@
           <a:p>
             <a:fld id="{5B3B0695-030B-9245-9AD3-84362AD4BE89}" type="datetimeFigureOut">
               <a:rPr lang="en-US" smtClean="0"/>
-              <a:t>9/16/25</a:t>
+              <a:t>10/13/25</a:t>
             </a:fld>
             <a:endParaRPr lang="en-US"/>
           </a:p>
@@ -1814,7 +1819,7 @@
           <a:p>
             <a:fld id="{5B3B0695-030B-9245-9AD3-84362AD4BE89}" type="datetimeFigureOut">
               <a:rPr lang="en-US" smtClean="0"/>
-              <a:t>9/16/25</a:t>
+              <a:t>10/13/25</a:t>
             </a:fld>
             <a:endParaRPr lang="en-US"/>
           </a:p>
@@ -1955,7 +1960,7 @@
           <a:p>
             <a:fld id="{5B3B0695-030B-9245-9AD3-84362AD4BE89}" type="datetimeFigureOut">
               <a:rPr lang="en-US" smtClean="0"/>
-              <a:t>9/16/25</a:t>
+              <a:t>10/13/25</a:t>
             </a:fld>
             <a:endParaRPr lang="en-US"/>
           </a:p>
@@ -2068,7 +2073,7 @@
           <a:p>
             <a:fld id="{5B3B0695-030B-9245-9AD3-84362AD4BE89}" type="datetimeFigureOut">
               <a:rPr lang="en-US" smtClean="0"/>
-              <a:t>9/16/25</a:t>
+              <a:t>10/13/25</a:t>
             </a:fld>
             <a:endParaRPr lang="en-US"/>
           </a:p>
@@ -2379,7 +2384,7 @@
           <a:p>
             <a:fld id="{5B3B0695-030B-9245-9AD3-84362AD4BE89}" type="datetimeFigureOut">
               <a:rPr lang="en-US" smtClean="0"/>
-              <a:t>9/16/25</a:t>
+              <a:t>10/13/25</a:t>
             </a:fld>
             <a:endParaRPr lang="en-US"/>
           </a:p>
@@ -2667,7 +2672,7 @@
           <a:p>
             <a:fld id="{5B3B0695-030B-9245-9AD3-84362AD4BE89}" type="datetimeFigureOut">
               <a:rPr lang="en-US" smtClean="0"/>
-              <a:t>9/16/25</a:t>
+              <a:t>10/13/25</a:t>
             </a:fld>
             <a:endParaRPr lang="en-US"/>
           </a:p>
@@ -2908,7 +2913,7 @@
           <a:p>
             <a:fld id="{5B3B0695-030B-9245-9AD3-84362AD4BE89}" type="datetimeFigureOut">
               <a:rPr lang="en-US" smtClean="0"/>
-              <a:t>9/16/25</a:t>
+              <a:t>10/13/25</a:t>
             </a:fld>
             <a:endParaRPr lang="en-US"/>
           </a:p>
@@ -3700,7 +3705,7 @@
         <p:spPr>
           <a:xfrm>
             <a:off x="9157643" y="266192"/>
-            <a:ext cx="1727589" cy="369332"/>
+            <a:ext cx="2715808" cy="369332"/>
           </a:xfrm>
           <a:prstGeom prst="rect">
             <a:avLst/>
@@ -3715,7 +3720,7 @@
           <a:p>
             <a:r>
               <a:rPr lang="en-US" dirty="0"/>
-              <a:t>Enterprise OV-1</a:t>
+              <a:t>Figure 5.1 Enterprise view</a:t>
             </a:r>
           </a:p>
         </p:txBody>
@@ -3951,53 +3956,6 @@
           </a:p>
         </p:txBody>
       </p:sp>
-      <p:sp>
-        <p:nvSpPr>
-          <p:cNvPr id="7" name="Oval 6">
-            <a:extLst>
-              <a:ext uri="{FF2B5EF4-FFF2-40B4-BE49-F238E27FC236}">
-                <a16:creationId xmlns:a16="http://schemas.microsoft.com/office/drawing/2014/main" id="{6B74D803-1A83-DB47-9FB2-90FCB999932F}"/>
-              </a:ext>
-            </a:extLst>
-          </p:cNvPr>
-          <p:cNvSpPr/>
-          <p:nvPr/>
-        </p:nvSpPr>
-        <p:spPr>
-          <a:xfrm>
-            <a:off x="2779776" y="2194560"/>
-            <a:ext cx="6742176" cy="2487168"/>
-          </a:xfrm>
-          <a:prstGeom prst="ellipse">
-            <a:avLst/>
-          </a:prstGeom>
-          <a:noFill/>
-        </p:spPr>
-        <p:style>
-          <a:lnRef idx="2">
-            <a:schemeClr val="accent1">
-              <a:shade val="15000"/>
-            </a:schemeClr>
-          </a:lnRef>
-          <a:fillRef idx="1">
-            <a:schemeClr val="accent1"/>
-          </a:fillRef>
-          <a:effectRef idx="0">
-            <a:schemeClr val="accent1"/>
-          </a:effectRef>
-          <a:fontRef idx="minor">
-            <a:schemeClr val="lt1"/>
-          </a:fontRef>
-        </p:style>
-        <p:txBody>
-          <a:bodyPr rtlCol="0" anchor="ctr"/>
-          <a:lstStyle/>
-          <a:p>
-            <a:pPr algn="ctr"/>
-            <a:endParaRPr lang="en-US"/>
-          </a:p>
-        </p:txBody>
-      </p:sp>
       <p:pic>
         <p:nvPicPr>
           <p:cNvPr id="3" name="Picture 2">
@@ -4028,6 +3986,47 @@
           </a:prstGeom>
         </p:spPr>
       </p:pic>
+      <p:sp>
+        <p:nvSpPr>
+          <p:cNvPr id="2" name="TextBox 1">
+            <a:extLst>
+              <a:ext uri="{FF2B5EF4-FFF2-40B4-BE49-F238E27FC236}">
+                <a16:creationId xmlns:a16="http://schemas.microsoft.com/office/drawing/2014/main" id="{93CFD80A-8973-7B8D-A170-C09FDEAA5473}"/>
+              </a:ext>
+            </a:extLst>
+          </p:cNvPr>
+          <p:cNvSpPr txBox="1"/>
+          <p:nvPr/>
+        </p:nvSpPr>
+        <p:spPr>
+          <a:xfrm>
+            <a:off x="7914997" y="219299"/>
+            <a:ext cx="3728072" cy="646331"/>
+          </a:xfrm>
+          <a:prstGeom prst="rect">
+            <a:avLst/>
+          </a:prstGeom>
+          <a:noFill/>
+        </p:spPr>
+        <p:txBody>
+          <a:bodyPr wrap="none" rtlCol="0">
+            <a:spAutoFit/>
+          </a:bodyPr>
+          <a:lstStyle/>
+          <a:p>
+            <a:r>
+              <a:rPr lang="en-US" dirty="0"/>
+              <a:t>Figure 6.1 Spatial Web Ontology</a:t>
+            </a:r>
+          </a:p>
+          <a:p>
+            <a:r>
+              <a:rPr lang="en-US" dirty="0"/>
+              <a:t>ALREADY EXISTS no need to remake</a:t>
+            </a:r>
+          </a:p>
+        </p:txBody>
+      </p:sp>
     </p:spTree>
     <p:extLst>
       <p:ext uri="{BB962C8B-B14F-4D97-AF65-F5344CB8AC3E}">
@@ -4066,70 +4065,19 @@
       </p:grpSpPr>
       <p:sp>
         <p:nvSpPr>
-          <p:cNvPr id="4" name="Rectangle 3">
-            <a:extLst>
-              <a:ext uri="{FF2B5EF4-FFF2-40B4-BE49-F238E27FC236}">
-                <a16:creationId xmlns:a16="http://schemas.microsoft.com/office/drawing/2014/main" id="{248D6E33-9D56-D703-211F-C52E79A8BB6E}"/>
-              </a:ext>
-            </a:extLst>
-          </p:cNvPr>
-          <p:cNvSpPr/>
+          <p:cNvPr id="5" name="TextBox 4">
+            <a:extLst>
+              <a:ext uri="{FF2B5EF4-FFF2-40B4-BE49-F238E27FC236}">
+                <a16:creationId xmlns:a16="http://schemas.microsoft.com/office/drawing/2014/main" id="{40901A9D-9662-55A6-304D-A36FEBBEBD9F}"/>
+              </a:ext>
+            </a:extLst>
+          </p:cNvPr>
+          <p:cNvSpPr txBox="1"/>
           <p:nvPr/>
         </p:nvSpPr>
         <p:spPr>
           <a:xfrm>
-            <a:off x="2595156" y="856343"/>
-            <a:ext cx="7100389" cy="5210629"/>
-          </a:xfrm>
-          <a:prstGeom prst="rect">
-            <a:avLst/>
-          </a:prstGeom>
-          <a:solidFill>
-            <a:schemeClr val="bg1">
-              <a:lumMod val="65000"/>
-            </a:schemeClr>
-          </a:solidFill>
-        </p:spPr>
-        <p:style>
-          <a:lnRef idx="2">
-            <a:schemeClr val="accent1">
-              <a:shade val="15000"/>
-            </a:schemeClr>
-          </a:lnRef>
-          <a:fillRef idx="1">
-            <a:schemeClr val="accent1"/>
-          </a:fillRef>
-          <a:effectRef idx="0">
-            <a:schemeClr val="accent1"/>
-          </a:effectRef>
-          <a:fontRef idx="minor">
-            <a:schemeClr val="lt1"/>
-          </a:fontRef>
-        </p:style>
-        <p:txBody>
-          <a:bodyPr rtlCol="0" anchor="ctr"/>
-          <a:lstStyle/>
-          <a:p>
-            <a:pPr algn="ctr"/>
-            <a:endParaRPr lang="en-US"/>
-          </a:p>
-        </p:txBody>
-      </p:sp>
-      <p:sp>
-        <p:nvSpPr>
-          <p:cNvPr id="5" name="TextBox 4">
-            <a:extLst>
-              <a:ext uri="{FF2B5EF4-FFF2-40B4-BE49-F238E27FC236}">
-                <a16:creationId xmlns:a16="http://schemas.microsoft.com/office/drawing/2014/main" id="{40901A9D-9662-55A6-304D-A36FEBBEBD9F}"/>
-              </a:ext>
-            </a:extLst>
-          </p:cNvPr>
-          <p:cNvSpPr txBox="1"/>
-          <p:nvPr/>
-        </p:nvSpPr>
-        <p:spPr>
-          <a:xfrm>
-            <a:off x="3523488" y="890016"/>
+            <a:off x="1694688" y="526600"/>
             <a:ext cx="2288062" cy="369332"/>
           </a:xfrm>
           <a:prstGeom prst="rect">
@@ -4147,52 +4095,6 @@
               <a:rPr lang="en-US" dirty="0"/>
               <a:t>Registries in the UDG</a:t>
             </a:r>
-          </a:p>
-        </p:txBody>
-      </p:sp>
-      <p:sp>
-        <p:nvSpPr>
-          <p:cNvPr id="7" name="Oval 6">
-            <a:extLst>
-              <a:ext uri="{FF2B5EF4-FFF2-40B4-BE49-F238E27FC236}">
-                <a16:creationId xmlns:a16="http://schemas.microsoft.com/office/drawing/2014/main" id="{AEAE5426-E017-4A1B-D1FA-CCA3FEBB4491}"/>
-              </a:ext>
-            </a:extLst>
-          </p:cNvPr>
-          <p:cNvSpPr/>
-          <p:nvPr/>
-        </p:nvSpPr>
-        <p:spPr>
-          <a:xfrm>
-            <a:off x="2779776" y="2194560"/>
-            <a:ext cx="6742176" cy="2487168"/>
-          </a:xfrm>
-          <a:prstGeom prst="ellipse">
-            <a:avLst/>
-          </a:prstGeom>
-        </p:spPr>
-        <p:style>
-          <a:lnRef idx="2">
-            <a:schemeClr val="accent1">
-              <a:shade val="15000"/>
-            </a:schemeClr>
-          </a:lnRef>
-          <a:fillRef idx="1">
-            <a:schemeClr val="accent1"/>
-          </a:fillRef>
-          <a:effectRef idx="0">
-            <a:schemeClr val="accent1"/>
-          </a:effectRef>
-          <a:fontRef idx="minor">
-            <a:schemeClr val="lt1"/>
-          </a:fontRef>
-        </p:style>
-        <p:txBody>
-          <a:bodyPr rtlCol="0" anchor="ctr"/>
-          <a:lstStyle/>
-          <a:p>
-            <a:pPr algn="ctr"/>
-            <a:endParaRPr lang="en-US"/>
           </a:p>
         </p:txBody>
       </p:sp>
@@ -4218,7 +4120,7 @@
         </p:blipFill>
         <p:spPr>
           <a:xfrm>
-            <a:off x="2635250" y="1003300"/>
+            <a:off x="888511" y="1097084"/>
             <a:ext cx="6921500" cy="4851400"/>
           </a:xfrm>
           <a:prstGeom prst="rect">
@@ -4226,6 +4128,85 @@
           </a:prstGeom>
         </p:spPr>
       </p:pic>
+      <p:sp>
+        <p:nvSpPr>
+          <p:cNvPr id="2" name="TextBox 1">
+            <a:extLst>
+              <a:ext uri="{FF2B5EF4-FFF2-40B4-BE49-F238E27FC236}">
+                <a16:creationId xmlns:a16="http://schemas.microsoft.com/office/drawing/2014/main" id="{B5B01D8A-B5C8-4661-92FD-99BFABECDBCC}"/>
+              </a:ext>
+            </a:extLst>
+          </p:cNvPr>
+          <p:cNvSpPr txBox="1"/>
+          <p:nvPr/>
+        </p:nvSpPr>
+        <p:spPr>
+          <a:xfrm>
+            <a:off x="8663354" y="152399"/>
+            <a:ext cx="3580147" cy="1754326"/>
+          </a:xfrm>
+          <a:prstGeom prst="rect">
+            <a:avLst/>
+          </a:prstGeom>
+          <a:noFill/>
+        </p:spPr>
+        <p:txBody>
+          <a:bodyPr wrap="none" rtlCol="0">
+            <a:spAutoFit/>
+          </a:bodyPr>
+          <a:lstStyle/>
+          <a:p>
+            <a:r>
+              <a:rPr lang="en-US" dirty="0"/>
+              <a:t>7.1 UDG network of registries</a:t>
+            </a:r>
+          </a:p>
+          <a:p>
+            <a:r>
+              <a:rPr lang="en-US" dirty="0" err="1"/>
+              <a:t>Orginally</a:t>
+            </a:r>
+            <a:r>
+              <a:rPr lang="en-US" dirty="0"/>
+              <a:t> developed by </a:t>
+            </a:r>
+            <a:r>
+              <a:rPr lang="en-US" dirty="0" err="1"/>
+              <a:t>Capm</a:t>
+            </a:r>
+            <a:endParaRPr lang="en-US" dirty="0"/>
+          </a:p>
+          <a:p>
+            <a:r>
+              <a:rPr lang="en-US" dirty="0"/>
+              <a:t>Needs </a:t>
+            </a:r>
+          </a:p>
+          <a:p>
+            <a:pPr marL="285750" indent="-285750">
+              <a:buFontTx/>
+              <a:buChar char="-"/>
+            </a:pPr>
+            <a:r>
+              <a:rPr lang="en-US" dirty="0"/>
+              <a:t>to look like other SWF diagrams</a:t>
+            </a:r>
+          </a:p>
+          <a:p>
+            <a:pPr marL="285750" indent="-285750">
+              <a:buFontTx/>
+              <a:buChar char="-"/>
+            </a:pPr>
+            <a:r>
+              <a:rPr lang="en-US" dirty="0"/>
+              <a:t>To be simplified</a:t>
+            </a:r>
+          </a:p>
+          <a:p>
+            <a:endParaRPr lang="en-US" dirty="0"/>
+          </a:p>
+        </p:txBody>
+      </p:sp>
     </p:spTree>
     <p:extLst>
       <p:ext uri="{BB962C8B-B14F-4D97-AF65-F5344CB8AC3E}">
@@ -4297,59 +4278,6 @@
           </a:p>
         </p:txBody>
       </p:sp>
-      <p:sp>
-        <p:nvSpPr>
-          <p:cNvPr id="7" name="Oval 6">
-            <a:extLst>
-              <a:ext uri="{FF2B5EF4-FFF2-40B4-BE49-F238E27FC236}">
-                <a16:creationId xmlns:a16="http://schemas.microsoft.com/office/drawing/2014/main" id="{EA585B46-9706-A23E-69F7-F2D2814DC3CA}"/>
-              </a:ext>
-            </a:extLst>
-          </p:cNvPr>
-          <p:cNvSpPr/>
-          <p:nvPr/>
-        </p:nvSpPr>
-        <p:spPr>
-          <a:xfrm>
-            <a:off x="2779776" y="2194560"/>
-            <a:ext cx="6742176" cy="2487168"/>
-          </a:xfrm>
-          <a:prstGeom prst="ellipse">
-            <a:avLst/>
-          </a:prstGeom>
-        </p:spPr>
-        <p:style>
-          <a:lnRef idx="2">
-            <a:schemeClr val="accent1">
-              <a:shade val="15000"/>
-            </a:schemeClr>
-          </a:lnRef>
-          <a:fillRef idx="1">
-            <a:schemeClr val="accent1"/>
-          </a:fillRef>
-          <a:effectRef idx="0">
-            <a:schemeClr val="accent1"/>
-          </a:effectRef>
-          <a:fontRef idx="minor">
-            <a:schemeClr val="lt1"/>
-          </a:fontRef>
-        </p:style>
-        <p:txBody>
-          <a:bodyPr rtlCol="0" anchor="ctr"/>
-          <a:lstStyle/>
-          <a:p>
-            <a:pPr algn="ctr"/>
-            <a:r>
-              <a:rPr lang="en-US" dirty="0" err="1"/>
-              <a:t>Daigram</a:t>
-            </a:r>
-            <a:r>
-              <a:rPr lang="en-US" dirty="0"/>
-              <a:t> from Pentland</a:t>
-            </a:r>
-          </a:p>
-        </p:txBody>
-      </p:sp>
       <p:pic>
         <p:nvPicPr>
           <p:cNvPr id="3" name="Picture 2">
@@ -4380,6 +4308,47 @@
           </a:prstGeom>
         </p:spPr>
       </p:pic>
+      <p:sp>
+        <p:nvSpPr>
+          <p:cNvPr id="2" name="TextBox 1">
+            <a:extLst>
+              <a:ext uri="{FF2B5EF4-FFF2-40B4-BE49-F238E27FC236}">
+                <a16:creationId xmlns:a16="http://schemas.microsoft.com/office/drawing/2014/main" id="{DF4B0CDF-D3D9-CE58-5F2C-AE6CB5532E07}"/>
+              </a:ext>
+            </a:extLst>
+          </p:cNvPr>
+          <p:cNvSpPr txBox="1"/>
+          <p:nvPr/>
+        </p:nvSpPr>
+        <p:spPr>
+          <a:xfrm>
+            <a:off x="9015046" y="762000"/>
+            <a:ext cx="2059988" cy="646331"/>
+          </a:xfrm>
+          <a:prstGeom prst="rect">
+            <a:avLst/>
+          </a:prstGeom>
+          <a:noFill/>
+        </p:spPr>
+        <p:txBody>
+          <a:bodyPr wrap="none" rtlCol="0">
+            <a:spAutoFit/>
+          </a:bodyPr>
+          <a:lstStyle/>
+          <a:p>
+            <a:r>
+              <a:rPr lang="en-US" dirty="0"/>
+              <a:t>Already exists.</a:t>
+            </a:r>
+          </a:p>
+          <a:p>
+            <a:r>
+              <a:rPr lang="en-US" dirty="0"/>
+              <a:t>No need to remake</a:t>
+            </a:r>
+          </a:p>
+        </p:txBody>
+      </p:sp>
     </p:spTree>
     <p:extLst>
       <p:ext uri="{BB962C8B-B14F-4D97-AF65-F5344CB8AC3E}">
@@ -4481,6 +4450,47 @@
           </a:prstGeom>
         </p:spPr>
       </p:pic>
+      <p:sp>
+        <p:nvSpPr>
+          <p:cNvPr id="2" name="TextBox 1">
+            <a:extLst>
+              <a:ext uri="{FF2B5EF4-FFF2-40B4-BE49-F238E27FC236}">
+                <a16:creationId xmlns:a16="http://schemas.microsoft.com/office/drawing/2014/main" id="{9F3891E0-6F37-FD6E-EBFA-8A5F9BEC9A25}"/>
+              </a:ext>
+            </a:extLst>
+          </p:cNvPr>
+          <p:cNvSpPr txBox="1"/>
+          <p:nvPr/>
+        </p:nvSpPr>
+        <p:spPr>
+          <a:xfrm>
+            <a:off x="9015046" y="762000"/>
+            <a:ext cx="2059988" cy="646331"/>
+          </a:xfrm>
+          <a:prstGeom prst="rect">
+            <a:avLst/>
+          </a:prstGeom>
+          <a:noFill/>
+        </p:spPr>
+        <p:txBody>
+          <a:bodyPr wrap="none" rtlCol="0">
+            <a:spAutoFit/>
+          </a:bodyPr>
+          <a:lstStyle/>
+          <a:p>
+            <a:r>
+              <a:rPr lang="en-US" dirty="0"/>
+              <a:t>Already exists.</a:t>
+            </a:r>
+          </a:p>
+          <a:p>
+            <a:r>
+              <a:rPr lang="en-US" dirty="0"/>
+              <a:t>No need to remake</a:t>
+            </a:r>
+          </a:p>
+        </p:txBody>
+      </p:sp>
     </p:spTree>
     <p:extLst>
       <p:ext uri="{BB962C8B-B14F-4D97-AF65-F5344CB8AC3E}">

</xml_diff>

<commit_message>
Change to a source file pptx
</commit_message>
<xml_diff>
--- a/UDG study diagrams.pptx
+++ b/UDG study diagrams.pptx
@@ -6,10 +6,11 @@
   </p:sldMasterIdLst>
   <p:sldIdLst>
     <p:sldId id="256" r:id="rId2"/>
-    <p:sldId id="257" r:id="rId3"/>
-    <p:sldId id="258" r:id="rId4"/>
-    <p:sldId id="259" r:id="rId5"/>
-    <p:sldId id="260" r:id="rId6"/>
+    <p:sldId id="261" r:id="rId3"/>
+    <p:sldId id="257" r:id="rId4"/>
+    <p:sldId id="258" r:id="rId5"/>
+    <p:sldId id="259" r:id="rId6"/>
+    <p:sldId id="260" r:id="rId7"/>
   </p:sldIdLst>
   <p:sldSz cx="12192000" cy="6858000"/>
   <p:notesSz cx="6858000" cy="9144000"/>
@@ -263,7 +264,7 @@
           <a:p>
             <a:fld id="{5B3B0695-030B-9245-9AD3-84362AD4BE89}" type="datetimeFigureOut">
               <a:rPr lang="en-US" smtClean="0"/>
-              <a:t>10/13/25</a:t>
+              <a:t>11/6/25</a:t>
             </a:fld>
             <a:endParaRPr lang="en-US"/>
           </a:p>
@@ -461,7 +462,7 @@
           <a:p>
             <a:fld id="{5B3B0695-030B-9245-9AD3-84362AD4BE89}" type="datetimeFigureOut">
               <a:rPr lang="en-US" smtClean="0"/>
-              <a:t>10/13/25</a:t>
+              <a:t>11/6/25</a:t>
             </a:fld>
             <a:endParaRPr lang="en-US"/>
           </a:p>
@@ -669,7 +670,7 @@
           <a:p>
             <a:fld id="{5B3B0695-030B-9245-9AD3-84362AD4BE89}" type="datetimeFigureOut">
               <a:rPr lang="en-US" smtClean="0"/>
-              <a:t>10/13/25</a:t>
+              <a:t>11/6/25</a:t>
             </a:fld>
             <a:endParaRPr lang="en-US"/>
           </a:p>
@@ -867,7 +868,7 @@
           <a:p>
             <a:fld id="{5B3B0695-030B-9245-9AD3-84362AD4BE89}" type="datetimeFigureOut">
               <a:rPr lang="en-US" smtClean="0"/>
-              <a:t>10/13/25</a:t>
+              <a:t>11/6/25</a:t>
             </a:fld>
             <a:endParaRPr lang="en-US"/>
           </a:p>
@@ -1142,7 +1143,7 @@
           <a:p>
             <a:fld id="{5B3B0695-030B-9245-9AD3-84362AD4BE89}" type="datetimeFigureOut">
               <a:rPr lang="en-US" smtClean="0"/>
-              <a:t>10/13/25</a:t>
+              <a:t>11/6/25</a:t>
             </a:fld>
             <a:endParaRPr lang="en-US"/>
           </a:p>
@@ -1407,7 +1408,7 @@
           <a:p>
             <a:fld id="{5B3B0695-030B-9245-9AD3-84362AD4BE89}" type="datetimeFigureOut">
               <a:rPr lang="en-US" smtClean="0"/>
-              <a:t>10/13/25</a:t>
+              <a:t>11/6/25</a:t>
             </a:fld>
             <a:endParaRPr lang="en-US"/>
           </a:p>
@@ -1819,7 +1820,7 @@
           <a:p>
             <a:fld id="{5B3B0695-030B-9245-9AD3-84362AD4BE89}" type="datetimeFigureOut">
               <a:rPr lang="en-US" smtClean="0"/>
-              <a:t>10/13/25</a:t>
+              <a:t>11/6/25</a:t>
             </a:fld>
             <a:endParaRPr lang="en-US"/>
           </a:p>
@@ -1960,7 +1961,7 @@
           <a:p>
             <a:fld id="{5B3B0695-030B-9245-9AD3-84362AD4BE89}" type="datetimeFigureOut">
               <a:rPr lang="en-US" smtClean="0"/>
-              <a:t>10/13/25</a:t>
+              <a:t>11/6/25</a:t>
             </a:fld>
             <a:endParaRPr lang="en-US"/>
           </a:p>
@@ -2073,7 +2074,7 @@
           <a:p>
             <a:fld id="{5B3B0695-030B-9245-9AD3-84362AD4BE89}" type="datetimeFigureOut">
               <a:rPr lang="en-US" smtClean="0"/>
-              <a:t>10/13/25</a:t>
+              <a:t>11/6/25</a:t>
             </a:fld>
             <a:endParaRPr lang="en-US"/>
           </a:p>
@@ -2384,7 +2385,7 @@
           <a:p>
             <a:fld id="{5B3B0695-030B-9245-9AD3-84362AD4BE89}" type="datetimeFigureOut">
               <a:rPr lang="en-US" smtClean="0"/>
-              <a:t>10/13/25</a:t>
+              <a:t>11/6/25</a:t>
             </a:fld>
             <a:endParaRPr lang="en-US"/>
           </a:p>
@@ -2672,7 +2673,7 @@
           <a:p>
             <a:fld id="{5B3B0695-030B-9245-9AD3-84362AD4BE89}" type="datetimeFigureOut">
               <a:rPr lang="en-US" smtClean="0"/>
-              <a:t>10/13/25</a:t>
+              <a:t>11/6/25</a:t>
             </a:fld>
             <a:endParaRPr lang="en-US"/>
           </a:p>
@@ -2913,7 +2914,7 @@
           <a:p>
             <a:fld id="{5B3B0695-030B-9245-9AD3-84362AD4BE89}" type="datetimeFigureOut">
               <a:rPr lang="en-US" smtClean="0"/>
-              <a:t>10/13/25</a:t>
+              <a:t>11/6/25</a:t>
             </a:fld>
             <a:endParaRPr lang="en-US"/>
           </a:p>
@@ -3898,6 +3899,933 @@
         <p:cNvPr id="1" name="">
           <a:extLst>
             <a:ext uri="{FF2B5EF4-FFF2-40B4-BE49-F238E27FC236}">
+              <a16:creationId xmlns:a16="http://schemas.microsoft.com/office/drawing/2014/main" id="{B9EAC0B2-B289-CF82-C2DB-8E8C3B399C6A}"/>
+            </a:ext>
+          </a:extLst>
+        </p:cNvPr>
+        <p:cNvGrpSpPr/>
+        <p:nvPr/>
+      </p:nvGrpSpPr>
+      <p:grpSpPr>
+        <a:xfrm>
+          <a:off x="0" y="0"/>
+          <a:ext cx="0" cy="0"/>
+          <a:chOff x="0" y="0"/>
+          <a:chExt cx="0" cy="0"/>
+        </a:xfrm>
+      </p:grpSpPr>
+      <p:sp>
+        <p:nvSpPr>
+          <p:cNvPr id="6" name="Rectangle 5">
+            <a:extLst>
+              <a:ext uri="{FF2B5EF4-FFF2-40B4-BE49-F238E27FC236}">
+                <a16:creationId xmlns:a16="http://schemas.microsoft.com/office/drawing/2014/main" id="{36727B99-3CC3-7114-550F-5CB8DB5D5391}"/>
+              </a:ext>
+            </a:extLst>
+          </p:cNvPr>
+          <p:cNvSpPr/>
+          <p:nvPr/>
+        </p:nvSpPr>
+        <p:spPr>
+          <a:xfrm>
+            <a:off x="2641225" y="3597987"/>
+            <a:ext cx="5286103" cy="2499360"/>
+          </a:xfrm>
+          <a:prstGeom prst="rect">
+            <a:avLst/>
+          </a:prstGeom>
+          <a:solidFill>
+            <a:schemeClr val="bg1">
+              <a:lumMod val="65000"/>
+            </a:schemeClr>
+          </a:solidFill>
+        </p:spPr>
+        <p:style>
+          <a:lnRef idx="2">
+            <a:schemeClr val="accent1">
+              <a:shade val="15000"/>
+            </a:schemeClr>
+          </a:lnRef>
+          <a:fillRef idx="1">
+            <a:schemeClr val="accent1"/>
+          </a:fillRef>
+          <a:effectRef idx="0">
+            <a:schemeClr val="accent1"/>
+          </a:effectRef>
+          <a:fontRef idx="minor">
+            <a:schemeClr val="lt1"/>
+          </a:fontRef>
+        </p:style>
+        <p:txBody>
+          <a:bodyPr rtlCol="0" anchor="ctr"/>
+          <a:lstStyle/>
+          <a:p>
+            <a:pPr algn="ctr"/>
+            <a:endParaRPr lang="en-US"/>
+          </a:p>
+        </p:txBody>
+      </p:sp>
+      <p:sp>
+        <p:nvSpPr>
+          <p:cNvPr id="23" name="TextBox 22">
+            <a:extLst>
+              <a:ext uri="{FF2B5EF4-FFF2-40B4-BE49-F238E27FC236}">
+                <a16:creationId xmlns:a16="http://schemas.microsoft.com/office/drawing/2014/main" id="{7E441ED3-1773-0F04-E577-6F897780FCC9}"/>
+              </a:ext>
+            </a:extLst>
+          </p:cNvPr>
+          <p:cNvSpPr txBox="1"/>
+          <p:nvPr/>
+        </p:nvSpPr>
+        <p:spPr>
+          <a:xfrm>
+            <a:off x="3046062" y="5695292"/>
+            <a:ext cx="4724691" cy="369332"/>
+          </a:xfrm>
+          <a:prstGeom prst="rect">
+            <a:avLst/>
+          </a:prstGeom>
+          <a:noFill/>
+        </p:spPr>
+        <p:txBody>
+          <a:bodyPr wrap="none" rtlCol="0">
+            <a:spAutoFit/>
+          </a:bodyPr>
+          <a:lstStyle/>
+          <a:p>
+            <a:r>
+              <a:rPr lang="en-US" dirty="0" err="1"/>
+              <a:t>Distrbuted</a:t>
+            </a:r>
+            <a:r>
+              <a:rPr lang="en-US" dirty="0"/>
+              <a:t> Computing View: SW nodes, HSTP </a:t>
+            </a:r>
+          </a:p>
+        </p:txBody>
+      </p:sp>
+      <p:sp>
+        <p:nvSpPr>
+          <p:cNvPr id="24" name="TextBox 23">
+            <a:extLst>
+              <a:ext uri="{FF2B5EF4-FFF2-40B4-BE49-F238E27FC236}">
+                <a16:creationId xmlns:a16="http://schemas.microsoft.com/office/drawing/2014/main" id="{EDFA72A8-6FE9-5B61-D294-0C57BBCD2F97}"/>
+              </a:ext>
+            </a:extLst>
+          </p:cNvPr>
+          <p:cNvSpPr txBox="1"/>
+          <p:nvPr/>
+        </p:nvSpPr>
+        <p:spPr>
+          <a:xfrm>
+            <a:off x="3382830" y="2888087"/>
+            <a:ext cx="3800606" cy="677108"/>
+          </a:xfrm>
+          <a:prstGeom prst="rect">
+            <a:avLst/>
+          </a:prstGeom>
+          <a:noFill/>
+        </p:spPr>
+        <p:txBody>
+          <a:bodyPr wrap="square" rtlCol="0">
+            <a:spAutoFit/>
+          </a:bodyPr>
+          <a:lstStyle/>
+          <a:p>
+            <a:pPr algn="ctr"/>
+            <a:r>
+              <a:rPr lang="en-US" sz="1600" dirty="0"/>
+              <a:t>UDG System Design</a:t>
+            </a:r>
+          </a:p>
+          <a:p>
+            <a:pPr algn="ctr"/>
+            <a:r>
+              <a:rPr lang="en-US" sz="1100" dirty="0"/>
+              <a:t>Functional requirements of conceptual </a:t>
+            </a:r>
+            <a:r>
+              <a:rPr lang="en-US" sz="1100" dirty="0" err="1"/>
+              <a:t>ciews</a:t>
+            </a:r>
+            <a:r>
+              <a:rPr lang="en-US" sz="1100" dirty="0"/>
+              <a:t> aligned with Spatial Web Nodes in the distributed computing view</a:t>
+            </a:r>
+          </a:p>
+        </p:txBody>
+      </p:sp>
+      <p:cxnSp>
+        <p:nvCxnSpPr>
+          <p:cNvPr id="26" name="Straight Arrow Connector 25">
+            <a:extLst>
+              <a:ext uri="{FF2B5EF4-FFF2-40B4-BE49-F238E27FC236}">
+                <a16:creationId xmlns:a16="http://schemas.microsoft.com/office/drawing/2014/main" id="{B0FEFABB-BB40-30FF-6862-781B89F9D70A}"/>
+              </a:ext>
+            </a:extLst>
+          </p:cNvPr>
+          <p:cNvCxnSpPr>
+            <a:cxnSpLocks/>
+          </p:cNvCxnSpPr>
+          <p:nvPr/>
+        </p:nvCxnSpPr>
+        <p:spPr>
+          <a:xfrm>
+            <a:off x="3228821" y="2804606"/>
+            <a:ext cx="0" cy="841271"/>
+          </a:xfrm>
+          <a:prstGeom prst="straightConnector1">
+            <a:avLst/>
+          </a:prstGeom>
+          <a:ln w="57150">
+            <a:headEnd type="triangle"/>
+            <a:tailEnd type="triangle"/>
+          </a:ln>
+        </p:spPr>
+        <p:style>
+          <a:lnRef idx="2">
+            <a:schemeClr val="accent1"/>
+          </a:lnRef>
+          <a:fillRef idx="0">
+            <a:schemeClr val="accent1"/>
+          </a:fillRef>
+          <a:effectRef idx="1">
+            <a:schemeClr val="accent1"/>
+          </a:effectRef>
+          <a:fontRef idx="minor">
+            <a:schemeClr val="tx1"/>
+          </a:fontRef>
+        </p:style>
+      </p:cxnSp>
+      <p:cxnSp>
+        <p:nvCxnSpPr>
+          <p:cNvPr id="27" name="Straight Arrow Connector 26">
+            <a:extLst>
+              <a:ext uri="{FF2B5EF4-FFF2-40B4-BE49-F238E27FC236}">
+                <a16:creationId xmlns:a16="http://schemas.microsoft.com/office/drawing/2014/main" id="{4A04D1E1-A175-406E-14C1-8E38F0A0F196}"/>
+              </a:ext>
+            </a:extLst>
+          </p:cNvPr>
+          <p:cNvCxnSpPr>
+            <a:cxnSpLocks/>
+          </p:cNvCxnSpPr>
+          <p:nvPr/>
+        </p:nvCxnSpPr>
+        <p:spPr>
+          <a:xfrm>
+            <a:off x="7337446" y="2837329"/>
+            <a:ext cx="0" cy="808548"/>
+          </a:xfrm>
+          <a:prstGeom prst="straightConnector1">
+            <a:avLst/>
+          </a:prstGeom>
+          <a:ln w="57150">
+            <a:headEnd type="triangle"/>
+            <a:tailEnd type="triangle"/>
+          </a:ln>
+        </p:spPr>
+        <p:style>
+          <a:lnRef idx="2">
+            <a:schemeClr val="accent1"/>
+          </a:lnRef>
+          <a:fillRef idx="0">
+            <a:schemeClr val="accent1"/>
+          </a:fillRef>
+          <a:effectRef idx="1">
+            <a:schemeClr val="accent1"/>
+          </a:effectRef>
+          <a:fontRef idx="minor">
+            <a:schemeClr val="tx1"/>
+          </a:fontRef>
+        </p:style>
+      </p:cxnSp>
+      <p:sp>
+        <p:nvSpPr>
+          <p:cNvPr id="4" name="Rounded Rectangle 3">
+            <a:extLst>
+              <a:ext uri="{FF2B5EF4-FFF2-40B4-BE49-F238E27FC236}">
+                <a16:creationId xmlns:a16="http://schemas.microsoft.com/office/drawing/2014/main" id="{86F2BBAB-DA3D-CBC8-3DA9-BF2D72EBE56B}"/>
+              </a:ext>
+            </a:extLst>
+          </p:cNvPr>
+          <p:cNvSpPr/>
+          <p:nvPr/>
+        </p:nvSpPr>
+        <p:spPr>
+          <a:xfrm>
+            <a:off x="3436240" y="4800772"/>
+            <a:ext cx="926124" cy="773723"/>
+          </a:xfrm>
+          <a:prstGeom prst="roundRect">
+            <a:avLst/>
+          </a:prstGeom>
+          <a:solidFill>
+            <a:schemeClr val="bg1">
+              <a:lumMod val="50000"/>
+            </a:schemeClr>
+          </a:solidFill>
+        </p:spPr>
+        <p:style>
+          <a:lnRef idx="2">
+            <a:schemeClr val="accent1">
+              <a:shade val="15000"/>
+            </a:schemeClr>
+          </a:lnRef>
+          <a:fillRef idx="1">
+            <a:schemeClr val="accent1"/>
+          </a:fillRef>
+          <a:effectRef idx="0">
+            <a:schemeClr val="accent1"/>
+          </a:effectRef>
+          <a:fontRef idx="minor">
+            <a:schemeClr val="lt1"/>
+          </a:fontRef>
+        </p:style>
+        <p:txBody>
+          <a:bodyPr rtlCol="0" anchor="ctr"/>
+          <a:lstStyle/>
+          <a:p>
+            <a:pPr algn="ctr"/>
+            <a:r>
+              <a:rPr lang="en-US" sz="1400" dirty="0">
+                <a:solidFill>
+                  <a:schemeClr val="tx1"/>
+                </a:solidFill>
+              </a:rPr>
+              <a:t>SW Content Node</a:t>
+            </a:r>
+          </a:p>
+        </p:txBody>
+      </p:sp>
+      <p:sp>
+        <p:nvSpPr>
+          <p:cNvPr id="10" name="Rounded Rectangle 9">
+            <a:extLst>
+              <a:ext uri="{FF2B5EF4-FFF2-40B4-BE49-F238E27FC236}">
+                <a16:creationId xmlns:a16="http://schemas.microsoft.com/office/drawing/2014/main" id="{7F504890-EF8B-11E5-4D81-B43A9046247B}"/>
+              </a:ext>
+            </a:extLst>
+          </p:cNvPr>
+          <p:cNvSpPr/>
+          <p:nvPr/>
+        </p:nvSpPr>
+        <p:spPr>
+          <a:xfrm>
+            <a:off x="3429342" y="3805172"/>
+            <a:ext cx="926124" cy="773723"/>
+          </a:xfrm>
+          <a:prstGeom prst="roundRect">
+            <a:avLst/>
+          </a:prstGeom>
+          <a:solidFill>
+            <a:schemeClr val="bg1">
+              <a:lumMod val="50000"/>
+            </a:schemeClr>
+          </a:solidFill>
+        </p:spPr>
+        <p:style>
+          <a:lnRef idx="2">
+            <a:schemeClr val="accent1">
+              <a:shade val="15000"/>
+            </a:schemeClr>
+          </a:lnRef>
+          <a:fillRef idx="1">
+            <a:schemeClr val="accent1"/>
+          </a:fillRef>
+          <a:effectRef idx="0">
+            <a:schemeClr val="accent1"/>
+          </a:effectRef>
+          <a:fontRef idx="minor">
+            <a:schemeClr val="lt1"/>
+          </a:fontRef>
+        </p:style>
+        <p:txBody>
+          <a:bodyPr rtlCol="0" anchor="ctr"/>
+          <a:lstStyle/>
+          <a:p>
+            <a:pPr algn="ctr"/>
+            <a:r>
+              <a:rPr lang="en-US" sz="1400" dirty="0">
+                <a:solidFill>
+                  <a:schemeClr val="tx1"/>
+                </a:solidFill>
+              </a:rPr>
+              <a:t>UDG Node</a:t>
+            </a:r>
+          </a:p>
+        </p:txBody>
+      </p:sp>
+      <p:sp>
+        <p:nvSpPr>
+          <p:cNvPr id="13" name="Rounded Rectangle 12">
+            <a:extLst>
+              <a:ext uri="{FF2B5EF4-FFF2-40B4-BE49-F238E27FC236}">
+                <a16:creationId xmlns:a16="http://schemas.microsoft.com/office/drawing/2014/main" id="{DBE6169B-5A07-8313-A83C-365E74FA1DBB}"/>
+              </a:ext>
+            </a:extLst>
+          </p:cNvPr>
+          <p:cNvSpPr/>
+          <p:nvPr/>
+        </p:nvSpPr>
+        <p:spPr>
+          <a:xfrm>
+            <a:off x="4773013" y="3835169"/>
+            <a:ext cx="926124" cy="773723"/>
+          </a:xfrm>
+          <a:prstGeom prst="roundRect">
+            <a:avLst/>
+          </a:prstGeom>
+          <a:solidFill>
+            <a:schemeClr val="bg1">
+              <a:lumMod val="50000"/>
+            </a:schemeClr>
+          </a:solidFill>
+        </p:spPr>
+        <p:style>
+          <a:lnRef idx="2">
+            <a:schemeClr val="accent1">
+              <a:shade val="15000"/>
+            </a:schemeClr>
+          </a:lnRef>
+          <a:fillRef idx="1">
+            <a:schemeClr val="accent1"/>
+          </a:fillRef>
+          <a:effectRef idx="0">
+            <a:schemeClr val="accent1"/>
+          </a:effectRef>
+          <a:fontRef idx="minor">
+            <a:schemeClr val="lt1"/>
+          </a:fontRef>
+        </p:style>
+        <p:txBody>
+          <a:bodyPr rtlCol="0" anchor="ctr"/>
+          <a:lstStyle/>
+          <a:p>
+            <a:pPr algn="ctr"/>
+            <a:r>
+              <a:rPr lang="en-US" sz="1400" dirty="0">
+                <a:solidFill>
+                  <a:schemeClr val="tx1"/>
+                </a:solidFill>
+              </a:rPr>
+              <a:t>Registry Node</a:t>
+            </a:r>
+          </a:p>
+        </p:txBody>
+      </p:sp>
+      <p:sp>
+        <p:nvSpPr>
+          <p:cNvPr id="14" name="Rounded Rectangle 13">
+            <a:extLst>
+              <a:ext uri="{FF2B5EF4-FFF2-40B4-BE49-F238E27FC236}">
+                <a16:creationId xmlns:a16="http://schemas.microsoft.com/office/drawing/2014/main" id="{3AA05F75-B4D5-732C-F1C6-52EA3662CB7A}"/>
+              </a:ext>
+            </a:extLst>
+          </p:cNvPr>
+          <p:cNvSpPr/>
+          <p:nvPr/>
+        </p:nvSpPr>
+        <p:spPr>
+          <a:xfrm>
+            <a:off x="4769394" y="4800772"/>
+            <a:ext cx="926124" cy="773723"/>
+          </a:xfrm>
+          <a:prstGeom prst="roundRect">
+            <a:avLst/>
+          </a:prstGeom>
+          <a:solidFill>
+            <a:schemeClr val="bg1">
+              <a:lumMod val="50000"/>
+            </a:schemeClr>
+          </a:solidFill>
+        </p:spPr>
+        <p:style>
+          <a:lnRef idx="2">
+            <a:schemeClr val="accent1">
+              <a:shade val="15000"/>
+            </a:schemeClr>
+          </a:lnRef>
+          <a:fillRef idx="1">
+            <a:schemeClr val="accent1"/>
+          </a:fillRef>
+          <a:effectRef idx="0">
+            <a:schemeClr val="accent1"/>
+          </a:effectRef>
+          <a:fontRef idx="minor">
+            <a:schemeClr val="lt1"/>
+          </a:fontRef>
+        </p:style>
+        <p:txBody>
+          <a:bodyPr rtlCol="0" anchor="ctr"/>
+          <a:lstStyle/>
+          <a:p>
+            <a:pPr algn="ctr"/>
+            <a:r>
+              <a:rPr lang="en-US" sz="1400" dirty="0">
+                <a:solidFill>
+                  <a:schemeClr val="tx1"/>
+                </a:solidFill>
+              </a:rPr>
+              <a:t>Agent Node</a:t>
+            </a:r>
+          </a:p>
+        </p:txBody>
+      </p:sp>
+      <p:sp>
+        <p:nvSpPr>
+          <p:cNvPr id="25" name="Rounded Rectangle 24">
+            <a:extLst>
+              <a:ext uri="{FF2B5EF4-FFF2-40B4-BE49-F238E27FC236}">
+                <a16:creationId xmlns:a16="http://schemas.microsoft.com/office/drawing/2014/main" id="{1AF6EA05-6798-3F5F-2257-E265CACDB49D}"/>
+              </a:ext>
+            </a:extLst>
+          </p:cNvPr>
+          <p:cNvSpPr/>
+          <p:nvPr/>
+        </p:nvSpPr>
+        <p:spPr>
+          <a:xfrm>
+            <a:off x="6102548" y="4800772"/>
+            <a:ext cx="926124" cy="773723"/>
+          </a:xfrm>
+          <a:prstGeom prst="roundRect">
+            <a:avLst/>
+          </a:prstGeom>
+          <a:solidFill>
+            <a:schemeClr val="bg1">
+              <a:lumMod val="50000"/>
+            </a:schemeClr>
+          </a:solidFill>
+        </p:spPr>
+        <p:style>
+          <a:lnRef idx="2">
+            <a:schemeClr val="accent1">
+              <a:shade val="15000"/>
+            </a:schemeClr>
+          </a:lnRef>
+          <a:fillRef idx="1">
+            <a:schemeClr val="accent1"/>
+          </a:fillRef>
+          <a:effectRef idx="0">
+            <a:schemeClr val="accent1"/>
+          </a:effectRef>
+          <a:fontRef idx="minor">
+            <a:schemeClr val="lt1"/>
+          </a:fontRef>
+        </p:style>
+        <p:txBody>
+          <a:bodyPr rtlCol="0" anchor="ctr"/>
+          <a:lstStyle/>
+          <a:p>
+            <a:pPr algn="ctr"/>
+            <a:r>
+              <a:rPr lang="en-US" sz="1400" dirty="0">
+                <a:solidFill>
+                  <a:schemeClr val="tx1"/>
+                </a:solidFill>
+              </a:rPr>
+              <a:t>Thing Node</a:t>
+            </a:r>
+          </a:p>
+        </p:txBody>
+      </p:sp>
+      <p:sp>
+        <p:nvSpPr>
+          <p:cNvPr id="29" name="Rounded Rectangle 28">
+            <a:extLst>
+              <a:ext uri="{FF2B5EF4-FFF2-40B4-BE49-F238E27FC236}">
+                <a16:creationId xmlns:a16="http://schemas.microsoft.com/office/drawing/2014/main" id="{C3806DF4-F3A3-181F-BB97-0F0B714E068B}"/>
+              </a:ext>
+            </a:extLst>
+          </p:cNvPr>
+          <p:cNvSpPr/>
+          <p:nvPr/>
+        </p:nvSpPr>
+        <p:spPr>
+          <a:xfrm>
+            <a:off x="6116685" y="3806551"/>
+            <a:ext cx="926124" cy="773723"/>
+          </a:xfrm>
+          <a:prstGeom prst="roundRect">
+            <a:avLst/>
+          </a:prstGeom>
+          <a:solidFill>
+            <a:schemeClr val="bg1">
+              <a:lumMod val="50000"/>
+            </a:schemeClr>
+          </a:solidFill>
+        </p:spPr>
+        <p:style>
+          <a:lnRef idx="2">
+            <a:schemeClr val="accent1">
+              <a:shade val="15000"/>
+            </a:schemeClr>
+          </a:lnRef>
+          <a:fillRef idx="1">
+            <a:schemeClr val="accent1"/>
+          </a:fillRef>
+          <a:effectRef idx="0">
+            <a:schemeClr val="accent1"/>
+          </a:effectRef>
+          <a:fontRef idx="minor">
+            <a:schemeClr val="lt1"/>
+          </a:fontRef>
+        </p:style>
+        <p:txBody>
+          <a:bodyPr rtlCol="0" anchor="ctr"/>
+          <a:lstStyle/>
+          <a:p>
+            <a:pPr algn="ctr"/>
+            <a:r>
+              <a:rPr lang="en-US" sz="1400" dirty="0">
+                <a:solidFill>
+                  <a:schemeClr val="tx1"/>
+                </a:solidFill>
+              </a:rPr>
+              <a:t>DID Issuer</a:t>
+            </a:r>
+          </a:p>
+        </p:txBody>
+      </p:sp>
+      <p:sp>
+        <p:nvSpPr>
+          <p:cNvPr id="19" name="Rectangle 18">
+            <a:extLst>
+              <a:ext uri="{FF2B5EF4-FFF2-40B4-BE49-F238E27FC236}">
+                <a16:creationId xmlns:a16="http://schemas.microsoft.com/office/drawing/2014/main" id="{884B11A4-3A2E-17A1-EC80-3AA7FB1CC334}"/>
+              </a:ext>
+            </a:extLst>
+          </p:cNvPr>
+          <p:cNvSpPr/>
+          <p:nvPr/>
+        </p:nvSpPr>
+        <p:spPr>
+          <a:xfrm>
+            <a:off x="2641225" y="480647"/>
+            <a:ext cx="5206276" cy="2327308"/>
+          </a:xfrm>
+          <a:prstGeom prst="rect">
+            <a:avLst/>
+          </a:prstGeom>
+          <a:solidFill>
+            <a:schemeClr val="bg1">
+              <a:lumMod val="65000"/>
+            </a:schemeClr>
+          </a:solidFill>
+        </p:spPr>
+        <p:style>
+          <a:lnRef idx="2">
+            <a:schemeClr val="accent1">
+              <a:shade val="15000"/>
+            </a:schemeClr>
+          </a:lnRef>
+          <a:fillRef idx="1">
+            <a:schemeClr val="accent1"/>
+          </a:fillRef>
+          <a:effectRef idx="0">
+            <a:schemeClr val="accent1"/>
+          </a:effectRef>
+          <a:fontRef idx="minor">
+            <a:schemeClr val="lt1"/>
+          </a:fontRef>
+        </p:style>
+        <p:txBody>
+          <a:bodyPr rtlCol="0" anchor="ctr"/>
+          <a:lstStyle/>
+          <a:p>
+            <a:pPr algn="ctr"/>
+            <a:endParaRPr lang="en-US" dirty="0"/>
+          </a:p>
+        </p:txBody>
+      </p:sp>
+      <p:sp>
+        <p:nvSpPr>
+          <p:cNvPr id="33" name="Rounded Rectangle 32">
+            <a:extLst>
+              <a:ext uri="{FF2B5EF4-FFF2-40B4-BE49-F238E27FC236}">
+                <a16:creationId xmlns:a16="http://schemas.microsoft.com/office/drawing/2014/main" id="{824DD99E-5001-FB75-BDBF-853799FE0B4D}"/>
+              </a:ext>
+            </a:extLst>
+          </p:cNvPr>
+          <p:cNvSpPr/>
+          <p:nvPr/>
+        </p:nvSpPr>
+        <p:spPr>
+          <a:xfrm>
+            <a:off x="3410037" y="1137138"/>
+            <a:ext cx="1711568" cy="656493"/>
+          </a:xfrm>
+          <a:prstGeom prst="roundRect">
+            <a:avLst/>
+          </a:prstGeom>
+          <a:solidFill>
+            <a:schemeClr val="bg1">
+              <a:lumMod val="50000"/>
+            </a:schemeClr>
+          </a:solidFill>
+        </p:spPr>
+        <p:style>
+          <a:lnRef idx="2">
+            <a:schemeClr val="accent1">
+              <a:shade val="15000"/>
+            </a:schemeClr>
+          </a:lnRef>
+          <a:fillRef idx="1">
+            <a:schemeClr val="accent1"/>
+          </a:fillRef>
+          <a:effectRef idx="0">
+            <a:schemeClr val="accent1"/>
+          </a:effectRef>
+          <a:fontRef idx="minor">
+            <a:schemeClr val="lt1"/>
+          </a:fontRef>
+        </p:style>
+        <p:txBody>
+          <a:bodyPr rtlCol="0" anchor="ctr"/>
+          <a:lstStyle/>
+          <a:p>
+            <a:pPr algn="ctr"/>
+            <a:r>
+              <a:rPr lang="en-US" sz="1400" dirty="0">
+                <a:solidFill>
+                  <a:schemeClr val="tx1"/>
+                </a:solidFill>
+              </a:rPr>
+              <a:t>UDG as a Knowledge Graph</a:t>
+            </a:r>
+          </a:p>
+        </p:txBody>
+      </p:sp>
+      <p:sp>
+        <p:nvSpPr>
+          <p:cNvPr id="34" name="Rounded Rectangle 33">
+            <a:extLst>
+              <a:ext uri="{FF2B5EF4-FFF2-40B4-BE49-F238E27FC236}">
+                <a16:creationId xmlns:a16="http://schemas.microsoft.com/office/drawing/2014/main" id="{A76AF698-3168-2F22-9005-68C636F5F9B9}"/>
+              </a:ext>
+            </a:extLst>
+          </p:cNvPr>
+          <p:cNvSpPr/>
+          <p:nvPr/>
+        </p:nvSpPr>
+        <p:spPr>
+          <a:xfrm>
+            <a:off x="3421759" y="1957754"/>
+            <a:ext cx="1723292" cy="679939"/>
+          </a:xfrm>
+          <a:prstGeom prst="roundRect">
+            <a:avLst/>
+          </a:prstGeom>
+          <a:solidFill>
+            <a:schemeClr val="bg1">
+              <a:lumMod val="50000"/>
+            </a:schemeClr>
+          </a:solidFill>
+        </p:spPr>
+        <p:style>
+          <a:lnRef idx="2">
+            <a:schemeClr val="accent1">
+              <a:shade val="15000"/>
+            </a:schemeClr>
+          </a:lnRef>
+          <a:fillRef idx="1">
+            <a:schemeClr val="accent1"/>
+          </a:fillRef>
+          <a:effectRef idx="0">
+            <a:schemeClr val="accent1"/>
+          </a:effectRef>
+          <a:fontRef idx="minor">
+            <a:schemeClr val="lt1"/>
+          </a:fontRef>
+        </p:style>
+        <p:txBody>
+          <a:bodyPr rtlCol="0" anchor="ctr"/>
+          <a:lstStyle/>
+          <a:p>
+            <a:pPr algn="ctr"/>
+            <a:r>
+              <a:rPr lang="en-US" sz="1400" dirty="0">
+                <a:solidFill>
+                  <a:schemeClr val="tx1"/>
+                </a:solidFill>
+              </a:rPr>
+              <a:t>UDG as a Network of Registries</a:t>
+            </a:r>
+          </a:p>
+        </p:txBody>
+      </p:sp>
+      <p:sp>
+        <p:nvSpPr>
+          <p:cNvPr id="35" name="Rounded Rectangle 34">
+            <a:extLst>
+              <a:ext uri="{FF2B5EF4-FFF2-40B4-BE49-F238E27FC236}">
+                <a16:creationId xmlns:a16="http://schemas.microsoft.com/office/drawing/2014/main" id="{D6508033-9555-CFD0-EEBA-0321050C1D26}"/>
+              </a:ext>
+            </a:extLst>
+          </p:cNvPr>
+          <p:cNvSpPr/>
+          <p:nvPr/>
+        </p:nvSpPr>
+        <p:spPr>
+          <a:xfrm>
+            <a:off x="5301932" y="1919136"/>
+            <a:ext cx="1663644" cy="716488"/>
+          </a:xfrm>
+          <a:prstGeom prst="roundRect">
+            <a:avLst/>
+          </a:prstGeom>
+          <a:solidFill>
+            <a:schemeClr val="bg1">
+              <a:lumMod val="50000"/>
+            </a:schemeClr>
+          </a:solidFill>
+        </p:spPr>
+        <p:style>
+          <a:lnRef idx="2">
+            <a:schemeClr val="accent1">
+              <a:shade val="15000"/>
+            </a:schemeClr>
+          </a:lnRef>
+          <a:fillRef idx="1">
+            <a:schemeClr val="accent1"/>
+          </a:fillRef>
+          <a:effectRef idx="0">
+            <a:schemeClr val="accent1"/>
+          </a:effectRef>
+          <a:fontRef idx="minor">
+            <a:schemeClr val="lt1"/>
+          </a:fontRef>
+        </p:style>
+        <p:txBody>
+          <a:bodyPr rtlCol="0" anchor="ctr"/>
+          <a:lstStyle/>
+          <a:p>
+            <a:pPr algn="ctr"/>
+            <a:r>
+              <a:rPr lang="en-US" sz="1400" dirty="0">
+                <a:solidFill>
+                  <a:schemeClr val="tx1"/>
+                </a:solidFill>
+              </a:rPr>
+              <a:t>UDG as a Social Network</a:t>
+            </a:r>
+          </a:p>
+        </p:txBody>
+      </p:sp>
+      <p:sp>
+        <p:nvSpPr>
+          <p:cNvPr id="36" name="Rounded Rectangle 35">
+            <a:extLst>
+              <a:ext uri="{FF2B5EF4-FFF2-40B4-BE49-F238E27FC236}">
+                <a16:creationId xmlns:a16="http://schemas.microsoft.com/office/drawing/2014/main" id="{3F5F111E-886F-2E39-E457-37D92320603E}"/>
+              </a:ext>
+            </a:extLst>
+          </p:cNvPr>
+          <p:cNvSpPr/>
+          <p:nvPr/>
+        </p:nvSpPr>
+        <p:spPr>
+          <a:xfrm>
+            <a:off x="5280212" y="1111969"/>
+            <a:ext cx="1712258" cy="679938"/>
+          </a:xfrm>
+          <a:prstGeom prst="roundRect">
+            <a:avLst/>
+          </a:prstGeom>
+          <a:solidFill>
+            <a:schemeClr val="bg1">
+              <a:lumMod val="50000"/>
+            </a:schemeClr>
+          </a:solidFill>
+        </p:spPr>
+        <p:style>
+          <a:lnRef idx="2">
+            <a:schemeClr val="accent1">
+              <a:shade val="15000"/>
+            </a:schemeClr>
+          </a:lnRef>
+          <a:fillRef idx="1">
+            <a:schemeClr val="accent1"/>
+          </a:fillRef>
+          <a:effectRef idx="0">
+            <a:schemeClr val="accent1"/>
+          </a:effectRef>
+          <a:fontRef idx="minor">
+            <a:schemeClr val="lt1"/>
+          </a:fontRef>
+        </p:style>
+        <p:txBody>
+          <a:bodyPr rtlCol="0" anchor="ctr"/>
+          <a:lstStyle/>
+          <a:p>
+            <a:pPr algn="ctr"/>
+            <a:r>
+              <a:rPr lang="en-US" sz="1400" dirty="0">
+                <a:solidFill>
+                  <a:schemeClr val="tx1"/>
+                </a:solidFill>
+              </a:rPr>
+              <a:t>UDG as a Hyperspace</a:t>
+            </a:r>
+          </a:p>
+        </p:txBody>
+      </p:sp>
+      <p:sp>
+        <p:nvSpPr>
+          <p:cNvPr id="5" name="TextBox 4">
+            <a:extLst>
+              <a:ext uri="{FF2B5EF4-FFF2-40B4-BE49-F238E27FC236}">
+                <a16:creationId xmlns:a16="http://schemas.microsoft.com/office/drawing/2014/main" id="{52523308-9C83-CF32-6E48-71646C049A12}"/>
+              </a:ext>
+            </a:extLst>
+          </p:cNvPr>
+          <p:cNvSpPr txBox="1"/>
+          <p:nvPr/>
+        </p:nvSpPr>
+        <p:spPr>
+          <a:xfrm>
+            <a:off x="3677679" y="624025"/>
+            <a:ext cx="3130985" cy="369332"/>
+          </a:xfrm>
+          <a:prstGeom prst="rect">
+            <a:avLst/>
+          </a:prstGeom>
+          <a:noFill/>
+        </p:spPr>
+        <p:txBody>
+          <a:bodyPr wrap="none" rtlCol="0">
+            <a:spAutoFit/>
+          </a:bodyPr>
+          <a:lstStyle/>
+          <a:p>
+            <a:r>
+              <a:rPr lang="en-US" dirty="0"/>
+              <a:t>Conceptual Views of the UDG</a:t>
+            </a:r>
+          </a:p>
+        </p:txBody>
+      </p:sp>
+    </p:spTree>
+    <p:extLst>
+      <p:ext uri="{BB962C8B-B14F-4D97-AF65-F5344CB8AC3E}">
+        <p14:creationId xmlns:p14="http://schemas.microsoft.com/office/powerpoint/2010/main" val="3939252091"/>
+      </p:ext>
+    </p:extLst>
+  </p:cSld>
+  <p:clrMapOvr>
+    <a:masterClrMapping/>
+  </p:clrMapOvr>
+</p:sld>
+</file>
+
+<file path=ppt/slides/slide3.xml><?xml version="1.0" encoding="utf-8"?>
+<p:sld xmlns:a="http://schemas.openxmlformats.org/drawingml/2006/main" xmlns:r="http://schemas.openxmlformats.org/officeDocument/2006/relationships" xmlns:p="http://schemas.openxmlformats.org/presentationml/2006/main">
+  <p:cSld>
+    <p:spTree>
+      <p:nvGrpSpPr>
+        <p:cNvPr id="1" name="">
+          <a:extLst>
+            <a:ext uri="{FF2B5EF4-FFF2-40B4-BE49-F238E27FC236}">
               <a16:creationId xmlns:a16="http://schemas.microsoft.com/office/drawing/2014/main" id="{C517288D-9935-419E-D4FD-EF88545FDE3B}"/>
             </a:ext>
           </a:extLst>
@@ -4040,7 +4968,7 @@
 </p:sld>
 </file>
 
-<file path=ppt/slides/slide3.xml><?xml version="1.0" encoding="utf-8"?>
+<file path=ppt/slides/slide4.xml><?xml version="1.0" encoding="utf-8"?>
 <p:sld xmlns:a="http://schemas.openxmlformats.org/drawingml/2006/main" xmlns:r="http://schemas.openxmlformats.org/officeDocument/2006/relationships" xmlns:p="http://schemas.openxmlformats.org/presentationml/2006/main">
   <p:cSld>
     <p:spTree>
@@ -4220,7 +5148,7 @@
 </p:sld>
 </file>
 
-<file path=ppt/slides/slide4.xml><?xml version="1.0" encoding="utf-8"?>
+<file path=ppt/slides/slide5.xml><?xml version="1.0" encoding="utf-8"?>
 <p:sld xmlns:a="http://schemas.openxmlformats.org/drawingml/2006/main" xmlns:r="http://schemas.openxmlformats.org/officeDocument/2006/relationships" xmlns:p="http://schemas.openxmlformats.org/presentationml/2006/main">
   <p:cSld>
     <p:spTree>
@@ -4362,7 +5290,7 @@
 </p:sld>
 </file>
 
-<file path=ppt/slides/slide5.xml><?xml version="1.0" encoding="utf-8"?>
+<file path=ppt/slides/slide6.xml><?xml version="1.0" encoding="utf-8"?>
 <p:sld xmlns:a="http://schemas.openxmlformats.org/drawingml/2006/main" xmlns:r="http://schemas.openxmlformats.org/officeDocument/2006/relationships" xmlns:p="http://schemas.openxmlformats.org/presentationml/2006/main">
   <p:cSld>
     <p:spTree>

</xml_diff>